<commit_message>
carga clases19 y 20
</commit_message>
<xml_diff>
--- a/Imagenes/presentacion_iconos.pptx
+++ b/Imagenes/presentacion_iconos.pptx
@@ -16,6 +16,8 @@
     <p:sldId id="264" r:id="rId10"/>
     <p:sldId id="265" r:id="rId11"/>
     <p:sldId id="266" r:id="rId12"/>
+    <p:sldId id="267" r:id="rId13"/>
+    <p:sldId id="268" r:id="rId14"/>
   </p:sldIdLst>
   <p:sldSz cx="12192000" cy="6858000"/>
   <p:notesSz cx="6858000" cy="9144000"/>
@@ -269,7 +271,7 @@
           <a:p>
             <a:fld id="{05E93951-F40E-4A2D-AEE9-CDC3C3196AFF}" type="datetimeFigureOut">
               <a:rPr lang="es-ES" smtClean="0"/>
-              <a:t>07/06/2024</a:t>
+              <a:t>12/06/2024</a:t>
             </a:fld>
             <a:endParaRPr lang="es-ES"/>
           </a:p>
@@ -467,7 +469,7 @@
           <a:p>
             <a:fld id="{05E93951-F40E-4A2D-AEE9-CDC3C3196AFF}" type="datetimeFigureOut">
               <a:rPr lang="es-ES" smtClean="0"/>
-              <a:t>07/06/2024</a:t>
+              <a:t>12/06/2024</a:t>
             </a:fld>
             <a:endParaRPr lang="es-ES"/>
           </a:p>
@@ -675,7 +677,7 @@
           <a:p>
             <a:fld id="{05E93951-F40E-4A2D-AEE9-CDC3C3196AFF}" type="datetimeFigureOut">
               <a:rPr lang="es-ES" smtClean="0"/>
-              <a:t>07/06/2024</a:t>
+              <a:t>12/06/2024</a:t>
             </a:fld>
             <a:endParaRPr lang="es-ES"/>
           </a:p>
@@ -873,7 +875,7 @@
           <a:p>
             <a:fld id="{05E93951-F40E-4A2D-AEE9-CDC3C3196AFF}" type="datetimeFigureOut">
               <a:rPr lang="es-ES" smtClean="0"/>
-              <a:t>07/06/2024</a:t>
+              <a:t>12/06/2024</a:t>
             </a:fld>
             <a:endParaRPr lang="es-ES"/>
           </a:p>
@@ -1148,7 +1150,7 @@
           <a:p>
             <a:fld id="{05E93951-F40E-4A2D-AEE9-CDC3C3196AFF}" type="datetimeFigureOut">
               <a:rPr lang="es-ES" smtClean="0"/>
-              <a:t>07/06/2024</a:t>
+              <a:t>12/06/2024</a:t>
             </a:fld>
             <a:endParaRPr lang="es-ES"/>
           </a:p>
@@ -1413,7 +1415,7 @@
           <a:p>
             <a:fld id="{05E93951-F40E-4A2D-AEE9-CDC3C3196AFF}" type="datetimeFigureOut">
               <a:rPr lang="es-ES" smtClean="0"/>
-              <a:t>07/06/2024</a:t>
+              <a:t>12/06/2024</a:t>
             </a:fld>
             <a:endParaRPr lang="es-ES"/>
           </a:p>
@@ -1825,7 +1827,7 @@
           <a:p>
             <a:fld id="{05E93951-F40E-4A2D-AEE9-CDC3C3196AFF}" type="datetimeFigureOut">
               <a:rPr lang="es-ES" smtClean="0"/>
-              <a:t>07/06/2024</a:t>
+              <a:t>12/06/2024</a:t>
             </a:fld>
             <a:endParaRPr lang="es-ES"/>
           </a:p>
@@ -1966,7 +1968,7 @@
           <a:p>
             <a:fld id="{05E93951-F40E-4A2D-AEE9-CDC3C3196AFF}" type="datetimeFigureOut">
               <a:rPr lang="es-ES" smtClean="0"/>
-              <a:t>07/06/2024</a:t>
+              <a:t>12/06/2024</a:t>
             </a:fld>
             <a:endParaRPr lang="es-ES"/>
           </a:p>
@@ -2079,7 +2081,7 @@
           <a:p>
             <a:fld id="{05E93951-F40E-4A2D-AEE9-CDC3C3196AFF}" type="datetimeFigureOut">
               <a:rPr lang="es-ES" smtClean="0"/>
-              <a:t>07/06/2024</a:t>
+              <a:t>12/06/2024</a:t>
             </a:fld>
             <a:endParaRPr lang="es-ES"/>
           </a:p>
@@ -2390,7 +2392,7 @@
           <a:p>
             <a:fld id="{05E93951-F40E-4A2D-AEE9-CDC3C3196AFF}" type="datetimeFigureOut">
               <a:rPr lang="es-ES" smtClean="0"/>
-              <a:t>07/06/2024</a:t>
+              <a:t>12/06/2024</a:t>
             </a:fld>
             <a:endParaRPr lang="es-ES"/>
           </a:p>
@@ -2678,7 +2680,7 @@
           <a:p>
             <a:fld id="{05E93951-F40E-4A2D-AEE9-CDC3C3196AFF}" type="datetimeFigureOut">
               <a:rPr lang="es-ES" smtClean="0"/>
-              <a:t>07/06/2024</a:t>
+              <a:t>12/06/2024</a:t>
             </a:fld>
             <a:endParaRPr lang="es-ES"/>
           </a:p>
@@ -2919,7 +2921,7 @@
           <a:p>
             <a:fld id="{05E93951-F40E-4A2D-AEE9-CDC3C3196AFF}" type="datetimeFigureOut">
               <a:rPr lang="es-ES" smtClean="0"/>
-              <a:t>07/06/2024</a:t>
+              <a:t>12/06/2024</a:t>
             </a:fld>
             <a:endParaRPr lang="es-ES"/>
           </a:p>
@@ -3934,6 +3936,444 @@
 </p:sld>
 </file>
 
+<file path=ppt/slides/slide12.xml><?xml version="1.0" encoding="utf-8"?>
+<p:sld xmlns:a="http://schemas.openxmlformats.org/drawingml/2006/main" xmlns:r="http://schemas.openxmlformats.org/officeDocument/2006/relationships" xmlns:p="http://schemas.openxmlformats.org/presentationml/2006/main">
+  <p:cSld>
+    <p:spTree>
+      <p:nvGrpSpPr>
+        <p:cNvPr id="1" name=""/>
+        <p:cNvGrpSpPr/>
+        <p:nvPr/>
+      </p:nvGrpSpPr>
+      <p:grpSpPr>
+        <a:xfrm>
+          <a:off x="0" y="0"/>
+          <a:ext cx="0" cy="0"/>
+          <a:chOff x="0" y="0"/>
+          <a:chExt cx="0" cy="0"/>
+        </a:xfrm>
+      </p:grpSpPr>
+      <p:sp>
+        <p:nvSpPr>
+          <p:cNvPr id="4" name="Rectángulo 3">
+            <a:extLst>
+              <a:ext uri="{FF2B5EF4-FFF2-40B4-BE49-F238E27FC236}">
+                <a16:creationId xmlns:a16="http://schemas.microsoft.com/office/drawing/2014/main" id="{8EFDB355-27DA-0002-9E99-6510DD170631}"/>
+              </a:ext>
+            </a:extLst>
+          </p:cNvPr>
+          <p:cNvSpPr/>
+          <p:nvPr/>
+        </p:nvSpPr>
+        <p:spPr>
+          <a:xfrm>
+            <a:off x="0" y="0"/>
+            <a:ext cx="6783355" cy="6858000"/>
+          </a:xfrm>
+          <a:prstGeom prst="rect">
+            <a:avLst/>
+          </a:prstGeom>
+          <a:solidFill>
+            <a:schemeClr val="accent6">
+              <a:lumMod val="75000"/>
+            </a:schemeClr>
+          </a:solidFill>
+          <a:ln>
+            <a:solidFill>
+              <a:schemeClr val="accent2">
+                <a:lumMod val="75000"/>
+              </a:schemeClr>
+            </a:solidFill>
+          </a:ln>
+        </p:spPr>
+        <p:style>
+          <a:lnRef idx="2">
+            <a:schemeClr val="accent1">
+              <a:shade val="15000"/>
+            </a:schemeClr>
+          </a:lnRef>
+          <a:fillRef idx="1">
+            <a:schemeClr val="accent1"/>
+          </a:fillRef>
+          <a:effectRef idx="0">
+            <a:schemeClr val="accent1"/>
+          </a:effectRef>
+          <a:fontRef idx="minor">
+            <a:schemeClr val="lt1"/>
+          </a:fontRef>
+        </p:style>
+        <p:txBody>
+          <a:bodyPr rtlCol="0" anchor="ctr"/>
+          <a:lstStyle/>
+          <a:p>
+            <a:pPr algn="ctr"/>
+            <a:r>
+              <a:rPr lang="es-MX" sz="6600" b="1" dirty="0"/>
+              <a:t>Computación </a:t>
+            </a:r>
+          </a:p>
+          <a:p>
+            <a:pPr algn="ctr"/>
+            <a:r>
+              <a:rPr lang="es-MX" sz="6600" b="1" dirty="0"/>
+              <a:t>distribuida</a:t>
+            </a:r>
+          </a:p>
+        </p:txBody>
+      </p:sp>
+      <p:sp>
+        <p:nvSpPr>
+          <p:cNvPr id="2" name="AutoShape 2" descr="icon_kmeans">
+            <a:extLst>
+              <a:ext uri="{FF2B5EF4-FFF2-40B4-BE49-F238E27FC236}">
+                <a16:creationId xmlns:a16="http://schemas.microsoft.com/office/drawing/2014/main" id="{584BB198-0B28-0510-93F2-28AD6D3F349A}"/>
+              </a:ext>
+            </a:extLst>
+          </p:cNvPr>
+          <p:cNvSpPr>
+            <a:spLocks noChangeAspect="1" noChangeArrowheads="1"/>
+          </p:cNvSpPr>
+          <p:nvPr/>
+        </p:nvSpPr>
+        <p:spPr bwMode="auto">
+          <a:xfrm>
+            <a:off x="5943600" y="3276600"/>
+            <a:ext cx="304800" cy="304800"/>
+          </a:xfrm>
+          <a:prstGeom prst="rect">
+            <a:avLst/>
+          </a:prstGeom>
+          <a:noFill/>
+          <a:extLst>
+            <a:ext uri="{909E8E84-426E-40DD-AFC4-6F175D3DCCD1}">
+              <a14:hiddenFill xmlns:a14="http://schemas.microsoft.com/office/drawing/2010/main">
+                <a:solidFill>
+                  <a:srgbClr val="FFFFFF"/>
+                </a:solidFill>
+              </a14:hiddenFill>
+            </a:ext>
+          </a:extLst>
+        </p:spPr>
+        <p:txBody>
+          <a:bodyPr vert="horz" wrap="square" lIns="91440" tIns="45720" rIns="91440" bIns="45720" numCol="1" anchor="t" anchorCtr="0" compatLnSpc="1">
+            <a:prstTxWarp prst="textNoShape">
+              <a:avLst/>
+            </a:prstTxWarp>
+          </a:bodyPr>
+          <a:lstStyle/>
+          <a:p>
+            <a:endParaRPr lang="es-ES"/>
+          </a:p>
+        </p:txBody>
+      </p:sp>
+      <p:pic>
+        <p:nvPicPr>
+          <p:cNvPr id="6" name="Imagen 5" descr="Icono&#10;&#10;Descripción generada automáticamente">
+            <a:extLst>
+              <a:ext uri="{FF2B5EF4-FFF2-40B4-BE49-F238E27FC236}">
+                <a16:creationId xmlns:a16="http://schemas.microsoft.com/office/drawing/2014/main" id="{F9940676-5121-6094-9BB4-DF1E35C5303E}"/>
+              </a:ext>
+            </a:extLst>
+          </p:cNvPr>
+          <p:cNvPicPr>
+            <a:picLocks noChangeAspect="1"/>
+          </p:cNvPicPr>
+          <p:nvPr/>
+        </p:nvPicPr>
+        <p:blipFill>
+          <a:blip r:embed="rId2">
+            <a:extLst>
+              <a:ext uri="{28A0092B-C50C-407E-A947-70E740481C1C}">
+                <a14:useLocalDpi xmlns:a14="http://schemas.microsoft.com/office/drawing/2010/main" val="0"/>
+              </a:ext>
+            </a:extLst>
+          </a:blip>
+          <a:stretch>
+            <a:fillRect/>
+          </a:stretch>
+        </p:blipFill>
+        <p:spPr>
+          <a:xfrm>
+            <a:off x="8280000" y="1080000"/>
+            <a:ext cx="2160000" cy="2160000"/>
+          </a:xfrm>
+          <a:prstGeom prst="rect">
+            <a:avLst/>
+          </a:prstGeom>
+        </p:spPr>
+      </p:pic>
+      <p:pic>
+        <p:nvPicPr>
+          <p:cNvPr id="9" name="Imagen 8" descr="Icono&#10;&#10;Descripción generada automáticamente">
+            <a:extLst>
+              <a:ext uri="{FF2B5EF4-FFF2-40B4-BE49-F238E27FC236}">
+                <a16:creationId xmlns:a16="http://schemas.microsoft.com/office/drawing/2014/main" id="{A4A5BF30-B6EA-5C6C-F473-5C3F59453138}"/>
+              </a:ext>
+            </a:extLst>
+          </p:cNvPr>
+          <p:cNvPicPr>
+            <a:picLocks noChangeAspect="1"/>
+          </p:cNvPicPr>
+          <p:nvPr/>
+        </p:nvPicPr>
+        <p:blipFill>
+          <a:blip r:embed="rId3">
+            <a:extLst>
+              <a:ext uri="{28A0092B-C50C-407E-A947-70E740481C1C}">
+                <a14:useLocalDpi xmlns:a14="http://schemas.microsoft.com/office/drawing/2010/main" val="0"/>
+              </a:ext>
+            </a:extLst>
+          </a:blip>
+          <a:stretch>
+            <a:fillRect/>
+          </a:stretch>
+        </p:blipFill>
+        <p:spPr>
+          <a:xfrm>
+            <a:off x="8280000" y="3600000"/>
+            <a:ext cx="2160000" cy="2160000"/>
+          </a:xfrm>
+          <a:prstGeom prst="rect">
+            <a:avLst/>
+          </a:prstGeom>
+        </p:spPr>
+      </p:pic>
+    </p:spTree>
+    <p:extLst>
+      <p:ext uri="{BB962C8B-B14F-4D97-AF65-F5344CB8AC3E}">
+        <p14:creationId xmlns:p14="http://schemas.microsoft.com/office/powerpoint/2010/main" val="4089130910"/>
+      </p:ext>
+    </p:extLst>
+  </p:cSld>
+  <p:clrMapOvr>
+    <a:masterClrMapping/>
+  </p:clrMapOvr>
+</p:sld>
+</file>
+
+<file path=ppt/slides/slide13.xml><?xml version="1.0" encoding="utf-8"?>
+<p:sld xmlns:a="http://schemas.openxmlformats.org/drawingml/2006/main" xmlns:r="http://schemas.openxmlformats.org/officeDocument/2006/relationships" xmlns:p="http://schemas.openxmlformats.org/presentationml/2006/main">
+  <p:cSld>
+    <p:spTree>
+      <p:nvGrpSpPr>
+        <p:cNvPr id="1" name=""/>
+        <p:cNvGrpSpPr/>
+        <p:nvPr/>
+      </p:nvGrpSpPr>
+      <p:grpSpPr>
+        <a:xfrm>
+          <a:off x="0" y="0"/>
+          <a:ext cx="0" cy="0"/>
+          <a:chOff x="0" y="0"/>
+          <a:chExt cx="0" cy="0"/>
+        </a:xfrm>
+      </p:grpSpPr>
+      <p:sp>
+        <p:nvSpPr>
+          <p:cNvPr id="4" name="Rectángulo 3">
+            <a:extLst>
+              <a:ext uri="{FF2B5EF4-FFF2-40B4-BE49-F238E27FC236}">
+                <a16:creationId xmlns:a16="http://schemas.microsoft.com/office/drawing/2014/main" id="{8EFDB355-27DA-0002-9E99-6510DD170631}"/>
+              </a:ext>
+            </a:extLst>
+          </p:cNvPr>
+          <p:cNvSpPr/>
+          <p:nvPr/>
+        </p:nvSpPr>
+        <p:spPr>
+          <a:xfrm>
+            <a:off x="0" y="0"/>
+            <a:ext cx="6783355" cy="6858000"/>
+          </a:xfrm>
+          <a:prstGeom prst="rect">
+            <a:avLst/>
+          </a:prstGeom>
+          <a:solidFill>
+            <a:schemeClr val="accent6">
+              <a:lumMod val="75000"/>
+            </a:schemeClr>
+          </a:solidFill>
+          <a:ln>
+            <a:solidFill>
+              <a:schemeClr val="accent2">
+                <a:lumMod val="75000"/>
+              </a:schemeClr>
+            </a:solidFill>
+          </a:ln>
+        </p:spPr>
+        <p:style>
+          <a:lnRef idx="2">
+            <a:schemeClr val="accent1">
+              <a:shade val="15000"/>
+            </a:schemeClr>
+          </a:lnRef>
+          <a:fillRef idx="1">
+            <a:schemeClr val="accent1"/>
+          </a:fillRef>
+          <a:effectRef idx="0">
+            <a:schemeClr val="accent1"/>
+          </a:effectRef>
+          <a:fontRef idx="minor">
+            <a:schemeClr val="lt1"/>
+          </a:fontRef>
+        </p:style>
+        <p:txBody>
+          <a:bodyPr rtlCol="0" anchor="ctr"/>
+          <a:lstStyle/>
+          <a:p>
+            <a:pPr algn="ctr"/>
+            <a:r>
+              <a:rPr lang="es-MX" sz="6600" b="1" dirty="0" err="1"/>
+              <a:t>Spark</a:t>
+            </a:r>
+            <a:r>
+              <a:rPr lang="es-MX" sz="6600" b="1" dirty="0"/>
+              <a:t> </a:t>
+            </a:r>
+          </a:p>
+          <a:p>
+            <a:pPr algn="ctr"/>
+            <a:r>
+              <a:rPr lang="es-MX" sz="6600" b="1" dirty="0" err="1"/>
+              <a:t>intro</a:t>
+            </a:r>
+            <a:r>
+              <a:rPr lang="es-MX" sz="6600" b="1" dirty="0"/>
+              <a:t> ML</a:t>
+            </a:r>
+          </a:p>
+        </p:txBody>
+      </p:sp>
+      <p:sp>
+        <p:nvSpPr>
+          <p:cNvPr id="2" name="AutoShape 2" descr="icon_kmeans">
+            <a:extLst>
+              <a:ext uri="{FF2B5EF4-FFF2-40B4-BE49-F238E27FC236}">
+                <a16:creationId xmlns:a16="http://schemas.microsoft.com/office/drawing/2014/main" id="{584BB198-0B28-0510-93F2-28AD6D3F349A}"/>
+              </a:ext>
+            </a:extLst>
+          </p:cNvPr>
+          <p:cNvSpPr>
+            <a:spLocks noChangeAspect="1" noChangeArrowheads="1"/>
+          </p:cNvSpPr>
+          <p:nvPr/>
+        </p:nvSpPr>
+        <p:spPr bwMode="auto">
+          <a:xfrm>
+            <a:off x="5943600" y="3276600"/>
+            <a:ext cx="304800" cy="304800"/>
+          </a:xfrm>
+          <a:prstGeom prst="rect">
+            <a:avLst/>
+          </a:prstGeom>
+          <a:noFill/>
+          <a:extLst>
+            <a:ext uri="{909E8E84-426E-40DD-AFC4-6F175D3DCCD1}">
+              <a14:hiddenFill xmlns:a14="http://schemas.microsoft.com/office/drawing/2010/main">
+                <a:solidFill>
+                  <a:srgbClr val="FFFFFF"/>
+                </a:solidFill>
+              </a14:hiddenFill>
+            </a:ext>
+          </a:extLst>
+        </p:spPr>
+        <p:txBody>
+          <a:bodyPr vert="horz" wrap="square" lIns="91440" tIns="45720" rIns="91440" bIns="45720" numCol="1" anchor="t" anchorCtr="0" compatLnSpc="1">
+            <a:prstTxWarp prst="textNoShape">
+              <a:avLst/>
+            </a:prstTxWarp>
+          </a:bodyPr>
+          <a:lstStyle/>
+          <a:p>
+            <a:endParaRPr lang="es-ES"/>
+          </a:p>
+        </p:txBody>
+      </p:sp>
+      <p:pic>
+        <p:nvPicPr>
+          <p:cNvPr id="5" name="Imagen 4" descr="Imagen que contiene dibujo&#10;&#10;Descripción generada automáticamente">
+            <a:extLst>
+              <a:ext uri="{FF2B5EF4-FFF2-40B4-BE49-F238E27FC236}">
+                <a16:creationId xmlns:a16="http://schemas.microsoft.com/office/drawing/2014/main" id="{0472B24D-10E3-9B61-5EA7-18E1B8F87365}"/>
+              </a:ext>
+            </a:extLst>
+          </p:cNvPr>
+          <p:cNvPicPr>
+            <a:picLocks noChangeAspect="1"/>
+          </p:cNvPicPr>
+          <p:nvPr/>
+        </p:nvPicPr>
+        <p:blipFill>
+          <a:blip r:embed="rId2">
+            <a:extLst>
+              <a:ext uri="{28A0092B-C50C-407E-A947-70E740481C1C}">
+                <a14:useLocalDpi xmlns:a14="http://schemas.microsoft.com/office/drawing/2010/main" val="0"/>
+              </a:ext>
+            </a:extLst>
+          </a:blip>
+          <a:stretch>
+            <a:fillRect/>
+          </a:stretch>
+        </p:blipFill>
+        <p:spPr>
+          <a:xfrm>
+            <a:off x="7919830" y="938005"/>
+            <a:ext cx="2971800" cy="1543050"/>
+          </a:xfrm>
+          <a:prstGeom prst="rect">
+            <a:avLst/>
+          </a:prstGeom>
+        </p:spPr>
+      </p:pic>
+      <p:pic>
+        <p:nvPicPr>
+          <p:cNvPr id="8" name="Imagen 7" descr="Un dibujo con letras&#10;&#10;Descripción generada automáticamente con confianza baja">
+            <a:extLst>
+              <a:ext uri="{FF2B5EF4-FFF2-40B4-BE49-F238E27FC236}">
+                <a16:creationId xmlns:a16="http://schemas.microsoft.com/office/drawing/2014/main" id="{D828D7AA-CE1A-853E-00F0-A5FCD612550D}"/>
+              </a:ext>
+            </a:extLst>
+          </p:cNvPr>
+          <p:cNvPicPr>
+            <a:picLocks noChangeAspect="1"/>
+          </p:cNvPicPr>
+          <p:nvPr/>
+        </p:nvPicPr>
+        <p:blipFill>
+          <a:blip r:embed="rId3">
+            <a:extLst>
+              <a:ext uri="{28A0092B-C50C-407E-A947-70E740481C1C}">
+                <a14:useLocalDpi xmlns:a14="http://schemas.microsoft.com/office/drawing/2010/main" val="0"/>
+              </a:ext>
+            </a:extLst>
+          </a:blip>
+          <a:stretch>
+            <a:fillRect/>
+          </a:stretch>
+        </p:blipFill>
+        <p:spPr>
+          <a:xfrm>
+            <a:off x="7738855" y="3653046"/>
+            <a:ext cx="3152775" cy="1447800"/>
+          </a:xfrm>
+          <a:prstGeom prst="rect">
+            <a:avLst/>
+          </a:prstGeom>
+        </p:spPr>
+      </p:pic>
+    </p:spTree>
+    <p:extLst>
+      <p:ext uri="{BB962C8B-B14F-4D97-AF65-F5344CB8AC3E}">
+        <p14:creationId xmlns:p14="http://schemas.microsoft.com/office/powerpoint/2010/main" val="2567241536"/>
+      </p:ext>
+    </p:extLst>
+  </p:cSld>
+  <p:clrMapOvr>
+    <a:masterClrMapping/>
+  </p:clrMapOvr>
+</p:sld>
+</file>
+
 <file path=ppt/slides/slide2.xml><?xml version="1.0" encoding="utf-8"?>
 <p:sld xmlns:a="http://schemas.openxmlformats.org/drawingml/2006/main" xmlns:r="http://schemas.openxmlformats.org/officeDocument/2006/relationships" xmlns:p="http://schemas.openxmlformats.org/presentationml/2006/main">
   <p:cSld>

</xml_diff>